<commit_message>
Lab 2 is complete
</commit_message>
<xml_diff>
--- a/Lab 2/CS 341 Lab 2.pptx
+++ b/Lab 2/CS 341 Lab 2.pptx
@@ -10,6 +10,7 @@
     <p:sldId id="268" r:id="rId4"/>
     <p:sldId id="269" r:id="rId5"/>
     <p:sldId id="270" r:id="rId6"/>
+    <p:sldId id="271" r:id="rId7"/>
   </p:sldIdLst>
   <p:sldSz cx="12192000" cy="6858000"/>
   <p:notesSz cx="6858000" cy="9144000"/>
@@ -5302,6 +5303,489 @@
 </p:sld>
 </file>
 
+<file path=ppt/slides/slide6.xml><?xml version="1.0" encoding="utf-8"?>
+<p:sld xmlns:a="http://schemas.openxmlformats.org/drawingml/2006/main" xmlns:r="http://schemas.openxmlformats.org/officeDocument/2006/relationships" xmlns:p="http://schemas.openxmlformats.org/presentationml/2006/main">
+  <p:cSld>
+    <p:bg>
+      <p:bgPr>
+        <a:solidFill>
+          <a:schemeClr val="bg1"/>
+        </a:solidFill>
+        <a:effectLst/>
+      </p:bgPr>
+    </p:bg>
+    <p:spTree>
+      <p:nvGrpSpPr>
+        <p:cNvPr id="1" name=""/>
+        <p:cNvGrpSpPr/>
+        <p:nvPr/>
+      </p:nvGrpSpPr>
+      <p:grpSpPr>
+        <a:xfrm>
+          <a:off x="0" y="0"/>
+          <a:ext cx="0" cy="0"/>
+          <a:chOff x="0" y="0"/>
+          <a:chExt cx="0" cy="0"/>
+        </a:xfrm>
+      </p:grpSpPr>
+      <p:sp useBgFill="1">
+        <p:nvSpPr>
+          <p:cNvPr id="47" name="Rectangle 38">
+            <a:extLst>
+              <a:ext uri="{FF2B5EF4-FFF2-40B4-BE49-F238E27FC236}">
+                <a16:creationId xmlns:a16="http://schemas.microsoft.com/office/drawing/2014/main" id="{90F35747-2822-4D06-BE10-CD33AC6B09C1}"/>
+              </a:ext>
+              <a:ext uri="{C183D7F6-B498-43B3-948B-1728B52AA6E4}">
+                <adec:decorative xmlns:adec="http://schemas.microsoft.com/office/drawing/2017/decorative" val="1"/>
+              </a:ext>
+            </a:extLst>
+          </p:cNvPr>
+          <p:cNvSpPr>
+            <a:spLocks noGrp="1" noRot="1" noChangeAspect="1" noMove="1" noResize="1" noEditPoints="1" noAdjustHandles="1" noChangeArrowheads="1" noChangeShapeType="1" noTextEdit="1"/>
+          </p:cNvSpPr>
+          <p:nvPr>
+            <p:extLst>
+              <p:ext uri="{386F3935-93C4-4BCD-93E2-E3B085C9AB24}">
+                <p16:designElem xmlns:p16="http://schemas.microsoft.com/office/powerpoint/2015/main" val="1"/>
+              </p:ext>
+            </p:extLst>
+          </p:nvPr>
+        </p:nvSpPr>
+        <p:spPr>
+          <a:xfrm>
+            <a:off x="0" y="0"/>
+            <a:ext cx="12190459" cy="6858000"/>
+          </a:xfrm>
+          <a:prstGeom prst="rect">
+            <a:avLst/>
+          </a:prstGeom>
+          <a:ln>
+            <a:noFill/>
+          </a:ln>
+        </p:spPr>
+        <p:style>
+          <a:lnRef idx="2">
+            <a:schemeClr val="accent1">
+              <a:shade val="50000"/>
+            </a:schemeClr>
+          </a:lnRef>
+          <a:fillRef idx="1">
+            <a:schemeClr val="accent1"/>
+          </a:fillRef>
+          <a:effectRef idx="0">
+            <a:schemeClr val="accent1"/>
+          </a:effectRef>
+          <a:fontRef idx="minor">
+            <a:schemeClr val="lt1"/>
+          </a:fontRef>
+        </p:style>
+        <p:txBody>
+          <a:bodyPr rtlCol="0" anchor="ctr"/>
+          <a:lstStyle/>
+          <a:p>
+            <a:pPr algn="ctr"/>
+            <a:endParaRPr lang="en-US"/>
+          </a:p>
+        </p:txBody>
+      </p:sp>
+      <p:sp>
+        <p:nvSpPr>
+          <p:cNvPr id="48" name="Rectangle 40">
+            <a:extLst>
+              <a:ext uri="{FF2B5EF4-FFF2-40B4-BE49-F238E27FC236}">
+                <a16:creationId xmlns:a16="http://schemas.microsoft.com/office/drawing/2014/main" id="{CC2C4466-5B1B-4361-B9D9-39ED9A8A3481}"/>
+              </a:ext>
+              <a:ext uri="{C183D7F6-B498-43B3-948B-1728B52AA6E4}">
+                <adec:decorative xmlns:adec="http://schemas.microsoft.com/office/drawing/2017/decorative" val="1"/>
+              </a:ext>
+            </a:extLst>
+          </p:cNvPr>
+          <p:cNvSpPr>
+            <a:spLocks noGrp="1" noRot="1" noChangeAspect="1" noMove="1" noResize="1" noEditPoints="1" noAdjustHandles="1" noChangeArrowheads="1" noChangeShapeType="1" noTextEdit="1"/>
+          </p:cNvSpPr>
+          <p:nvPr>
+            <p:extLst>
+              <p:ext uri="{386F3935-93C4-4BCD-93E2-E3B085C9AB24}">
+                <p16:designElem xmlns:p16="http://schemas.microsoft.com/office/powerpoint/2015/main" val="1"/>
+              </p:ext>
+            </p:extLst>
+          </p:nvPr>
+        </p:nvSpPr>
+        <p:spPr bwMode="white">
+          <a:xfrm>
+            <a:off x="15" y="0"/>
+            <a:ext cx="7547879" cy="6858000"/>
+          </a:xfrm>
+          <a:prstGeom prst="rect">
+            <a:avLst/>
+          </a:prstGeom>
+          <a:solidFill>
+            <a:schemeClr val="accent2"/>
+          </a:solidFill>
+          <a:ln>
+            <a:noFill/>
+          </a:ln>
+        </p:spPr>
+        <p:style>
+          <a:lnRef idx="2">
+            <a:schemeClr val="accent1">
+              <a:shade val="50000"/>
+            </a:schemeClr>
+          </a:lnRef>
+          <a:fillRef idx="1">
+            <a:schemeClr val="accent1"/>
+          </a:fillRef>
+          <a:effectRef idx="0">
+            <a:schemeClr val="accent1"/>
+          </a:effectRef>
+          <a:fontRef idx="minor">
+            <a:schemeClr val="lt1"/>
+          </a:fontRef>
+        </p:style>
+      </p:sp>
+      <p:sp>
+        <p:nvSpPr>
+          <p:cNvPr id="2" name="Title 1">
+            <a:extLst>
+              <a:ext uri="{FF2B5EF4-FFF2-40B4-BE49-F238E27FC236}">
+                <a16:creationId xmlns:a16="http://schemas.microsoft.com/office/drawing/2014/main" id="{0BF4DE65-6919-4E58-8131-4322B8157BF1}"/>
+              </a:ext>
+            </a:extLst>
+          </p:cNvPr>
+          <p:cNvSpPr>
+            <a:spLocks noGrp="1"/>
+          </p:cNvSpPr>
+          <p:nvPr>
+            <p:ph type="title"/>
+          </p:nvPr>
+        </p:nvSpPr>
+        <p:spPr>
+          <a:xfrm>
+            <a:off x="1097280" y="516835"/>
+            <a:ext cx="5977937" cy="1666501"/>
+          </a:xfrm>
+        </p:spPr>
+        <p:txBody>
+          <a:bodyPr>
+            <a:normAutofit/>
+          </a:bodyPr>
+          <a:lstStyle/>
+          <a:p>
+            <a:r>
+              <a:rPr lang="en-US" sz="4000" dirty="0">
+                <a:solidFill>
+                  <a:srgbClr val="FFFFFF"/>
+                </a:solidFill>
+              </a:rPr>
+              <a:t>Example Output</a:t>
+            </a:r>
+          </a:p>
+        </p:txBody>
+      </p:sp>
+      <p:sp>
+        <p:nvSpPr>
+          <p:cNvPr id="9" name="Content Placeholder 8">
+            <a:extLst>
+              <a:ext uri="{FF2B5EF4-FFF2-40B4-BE49-F238E27FC236}">
+                <a16:creationId xmlns:a16="http://schemas.microsoft.com/office/drawing/2014/main" id="{74C70986-94EA-4136-9AED-3624F2BC2BEC}"/>
+              </a:ext>
+            </a:extLst>
+          </p:cNvPr>
+          <p:cNvSpPr>
+            <a:spLocks noGrp="1"/>
+          </p:cNvSpPr>
+          <p:nvPr>
+            <p:ph idx="1"/>
+          </p:nvPr>
+        </p:nvSpPr>
+        <p:spPr>
+          <a:xfrm>
+            <a:off x="1097279" y="2236304"/>
+            <a:ext cx="5977938" cy="3652667"/>
+          </a:xfrm>
+        </p:spPr>
+        <p:txBody>
+          <a:bodyPr>
+            <a:normAutofit/>
+          </a:bodyPr>
+          <a:lstStyle/>
+          <a:p>
+            <a:pPr>
+              <a:buFont typeface="Wingdings" panose="05000000000000000000" pitchFamily="2" charset="2"/>
+              <a:buChar char="§"/>
+            </a:pPr>
+            <a:r>
+              <a:rPr lang="en-US" sz="1800" dirty="0">
+                <a:solidFill>
+                  <a:srgbClr val="FFFFFF"/>
+                </a:solidFill>
+              </a:rPr>
+              <a:t> The string “Array 4” is found at memory address 0x20A</a:t>
+            </a:r>
+          </a:p>
+        </p:txBody>
+      </p:sp>
+      <p:sp>
+        <p:nvSpPr>
+          <p:cNvPr id="49" name="Rectangle 42">
+            <a:extLst>
+              <a:ext uri="{FF2B5EF4-FFF2-40B4-BE49-F238E27FC236}">
+                <a16:creationId xmlns:a16="http://schemas.microsoft.com/office/drawing/2014/main" id="{FD745DAE-5A8A-44FA-937C-CD65CF7AE696}"/>
+              </a:ext>
+              <a:ext uri="{C183D7F6-B498-43B3-948B-1728B52AA6E4}">
+                <adec:decorative xmlns:adec="http://schemas.microsoft.com/office/drawing/2017/decorative" val="1"/>
+              </a:ext>
+            </a:extLst>
+          </p:cNvPr>
+          <p:cNvSpPr>
+            <a:spLocks noGrp="1" noRot="1" noChangeAspect="1" noMove="1" noResize="1" noEditPoints="1" noAdjustHandles="1" noChangeArrowheads="1" noChangeShapeType="1" noTextEdit="1"/>
+          </p:cNvSpPr>
+          <p:nvPr>
+            <p:extLst>
+              <p:ext uri="{386F3935-93C4-4BCD-93E2-E3B085C9AB24}">
+                <p16:designElem xmlns:p16="http://schemas.microsoft.com/office/powerpoint/2015/main" val="1"/>
+              </p:ext>
+            </p:extLst>
+          </p:nvPr>
+        </p:nvSpPr>
+        <p:spPr>
+          <a:xfrm>
+            <a:off x="7547894" y="0"/>
+            <a:ext cx="64008" cy="6858000"/>
+          </a:xfrm>
+          <a:prstGeom prst="rect">
+            <a:avLst/>
+          </a:prstGeom>
+          <a:solidFill>
+            <a:schemeClr val="accent1"/>
+          </a:solidFill>
+          <a:ln>
+            <a:noFill/>
+          </a:ln>
+        </p:spPr>
+        <p:style>
+          <a:lnRef idx="2">
+            <a:schemeClr val="accent1">
+              <a:shade val="50000"/>
+            </a:schemeClr>
+          </a:lnRef>
+          <a:fillRef idx="1">
+            <a:schemeClr val="accent1"/>
+          </a:fillRef>
+          <a:effectRef idx="0">
+            <a:schemeClr val="accent1"/>
+          </a:effectRef>
+          <a:fontRef idx="minor">
+            <a:schemeClr val="lt1"/>
+          </a:fontRef>
+        </p:style>
+      </p:sp>
+      <p:pic>
+        <p:nvPicPr>
+          <p:cNvPr id="7" name="Picture 6">
+            <a:extLst>
+              <a:ext uri="{FF2B5EF4-FFF2-40B4-BE49-F238E27FC236}">
+                <a16:creationId xmlns:a16="http://schemas.microsoft.com/office/drawing/2014/main" id="{81C28762-DD4B-4415-9E2C-DE31BC0D330D}"/>
+              </a:ext>
+            </a:extLst>
+          </p:cNvPr>
+          <p:cNvPicPr>
+            <a:picLocks noChangeAspect="1"/>
+          </p:cNvPicPr>
+          <p:nvPr/>
+        </p:nvPicPr>
+        <p:blipFill>
+          <a:blip r:embed="rId2"/>
+          <a:stretch>
+            <a:fillRect/>
+          </a:stretch>
+        </p:blipFill>
+        <p:spPr>
+          <a:xfrm>
+            <a:off x="8064529" y="3926683"/>
+            <a:ext cx="3609294" cy="2196540"/>
+          </a:xfrm>
+          <a:prstGeom prst="rect">
+            <a:avLst/>
+          </a:prstGeom>
+        </p:spPr>
+      </p:pic>
+      <p:sp>
+        <p:nvSpPr>
+          <p:cNvPr id="50" name="Rectangle 44">
+            <a:extLst>
+              <a:ext uri="{FF2B5EF4-FFF2-40B4-BE49-F238E27FC236}">
+                <a16:creationId xmlns:a16="http://schemas.microsoft.com/office/drawing/2014/main" id="{67696AA1-B1DD-4C75-9AC1-69EE9F65FF96}"/>
+              </a:ext>
+              <a:ext uri="{C183D7F6-B498-43B3-948B-1728B52AA6E4}">
+                <adec:decorative xmlns:adec="http://schemas.microsoft.com/office/drawing/2017/decorative" val="1"/>
+              </a:ext>
+            </a:extLst>
+          </p:cNvPr>
+          <p:cNvSpPr>
+            <a:spLocks noGrp="1" noRot="1" noChangeAspect="1" noMove="1" noResize="1" noEditPoints="1" noAdjustHandles="1" noChangeArrowheads="1" noChangeShapeType="1" noTextEdit="1"/>
+          </p:cNvSpPr>
+          <p:nvPr>
+            <p:extLst>
+              <p:ext uri="{386F3935-93C4-4BCD-93E2-E3B085C9AB24}">
+                <p16:designElem xmlns:p16="http://schemas.microsoft.com/office/powerpoint/2015/main" val="1"/>
+              </p:ext>
+            </p:extLst>
+          </p:nvPr>
+        </p:nvSpPr>
+        <p:spPr>
+          <a:xfrm>
+            <a:off x="7547894" y="3396996"/>
+            <a:ext cx="4642565" cy="64008"/>
+          </a:xfrm>
+          <a:prstGeom prst="rect">
+            <a:avLst/>
+          </a:prstGeom>
+          <a:solidFill>
+            <a:schemeClr val="accent1"/>
+          </a:solidFill>
+          <a:ln>
+            <a:noFill/>
+          </a:ln>
+        </p:spPr>
+        <p:style>
+          <a:lnRef idx="2">
+            <a:schemeClr val="accent1">
+              <a:shade val="50000"/>
+            </a:schemeClr>
+          </a:lnRef>
+          <a:fillRef idx="1">
+            <a:schemeClr val="accent1"/>
+          </a:fillRef>
+          <a:effectRef idx="0">
+            <a:schemeClr val="accent1"/>
+          </a:effectRef>
+          <a:fontRef idx="minor">
+            <a:schemeClr val="lt1"/>
+          </a:fontRef>
+        </p:style>
+        <p:txBody>
+          <a:bodyPr rtlCol="0" anchor="ctr"/>
+          <a:lstStyle/>
+          <a:p>
+            <a:pPr algn="ctr"/>
+            <a:endParaRPr lang="en-US"/>
+          </a:p>
+        </p:txBody>
+      </p:sp>
+      <p:pic>
+        <p:nvPicPr>
+          <p:cNvPr id="5" name="Content Placeholder 4" descr="Background pattern&#10;&#10;Description automatically generated">
+            <a:extLst>
+              <a:ext uri="{FF2B5EF4-FFF2-40B4-BE49-F238E27FC236}">
+                <a16:creationId xmlns:a16="http://schemas.microsoft.com/office/drawing/2014/main" id="{E25E7606-EFCD-4D4C-8926-3B71A49B56DB}"/>
+              </a:ext>
+            </a:extLst>
+          </p:cNvPr>
+          <p:cNvPicPr>
+            <a:picLocks noChangeAspect="1"/>
+          </p:cNvPicPr>
+          <p:nvPr/>
+        </p:nvPicPr>
+        <p:blipFill>
+          <a:blip r:embed="rId3"/>
+          <a:stretch>
+            <a:fillRect/>
+          </a:stretch>
+        </p:blipFill>
+        <p:spPr>
+          <a:xfrm>
+            <a:off x="8399274" y="340685"/>
+            <a:ext cx="2939803" cy="2590632"/>
+          </a:xfrm>
+          <a:prstGeom prst="rect">
+            <a:avLst/>
+          </a:prstGeom>
+        </p:spPr>
+      </p:pic>
+      <p:sp>
+        <p:nvSpPr>
+          <p:cNvPr id="8" name="TextBox 7">
+            <a:extLst>
+              <a:ext uri="{FF2B5EF4-FFF2-40B4-BE49-F238E27FC236}">
+                <a16:creationId xmlns:a16="http://schemas.microsoft.com/office/drawing/2014/main" id="{78378076-E79A-41C3-8AEF-2DA784494FAA}"/>
+              </a:ext>
+            </a:extLst>
+          </p:cNvPr>
+          <p:cNvSpPr txBox="1"/>
+          <p:nvPr/>
+        </p:nvSpPr>
+        <p:spPr>
+          <a:xfrm>
+            <a:off x="8546086" y="0"/>
+            <a:ext cx="2713376" cy="369332"/>
+          </a:xfrm>
+          <a:prstGeom prst="rect">
+            <a:avLst/>
+          </a:prstGeom>
+          <a:noFill/>
+        </p:spPr>
+        <p:txBody>
+          <a:bodyPr wrap="square" rtlCol="0">
+            <a:spAutoFit/>
+          </a:bodyPr>
+          <a:lstStyle/>
+          <a:p>
+            <a:r>
+              <a:rPr lang="en-US" dirty="0"/>
+              <a:t>Ran with hex set to false</a:t>
+            </a:r>
+          </a:p>
+        </p:txBody>
+      </p:sp>
+      <p:sp>
+        <p:nvSpPr>
+          <p:cNvPr id="10" name="TextBox 9">
+            <a:extLst>
+              <a:ext uri="{FF2B5EF4-FFF2-40B4-BE49-F238E27FC236}">
+                <a16:creationId xmlns:a16="http://schemas.microsoft.com/office/drawing/2014/main" id="{B3E48800-D41D-49F0-A91C-93CA5259326A}"/>
+              </a:ext>
+            </a:extLst>
+          </p:cNvPr>
+          <p:cNvSpPr txBox="1"/>
+          <p:nvPr/>
+        </p:nvSpPr>
+        <p:spPr>
+          <a:xfrm>
+            <a:off x="8546086" y="3510963"/>
+            <a:ext cx="2713376" cy="369332"/>
+          </a:xfrm>
+          <a:prstGeom prst="rect">
+            <a:avLst/>
+          </a:prstGeom>
+          <a:noFill/>
+        </p:spPr>
+        <p:txBody>
+          <a:bodyPr wrap="square" rtlCol="0">
+            <a:spAutoFit/>
+          </a:bodyPr>
+          <a:lstStyle/>
+          <a:p>
+            <a:r>
+              <a:rPr lang="en-US" dirty="0"/>
+              <a:t>Ran with hex set to true</a:t>
+            </a:r>
+          </a:p>
+        </p:txBody>
+      </p:sp>
+    </p:spTree>
+    <p:extLst>
+      <p:ext uri="{BB962C8B-B14F-4D97-AF65-F5344CB8AC3E}">
+        <p14:creationId xmlns:p14="http://schemas.microsoft.com/office/powerpoint/2010/main" val="3252314516"/>
+      </p:ext>
+    </p:extLst>
+  </p:cSld>
+  <p:clrMapOvr>
+    <a:masterClrMapping/>
+  </p:clrMapOvr>
+</p:sld>
+</file>
+
 <file path=ppt/theme/theme1.xml><?xml version="1.0" encoding="utf-8"?>
 <a:theme xmlns:a="http://schemas.openxmlformats.org/drawingml/2006/main" name="Retrospect">
   <a:themeElements>

</xml_diff>